<commit_message>
Docs Final-WireFrame by Ohjeong | S03P22A305-7
</commit_message>
<xml_diff>
--- a/doc/발표자료/20200908_1차_팀플레이어_발표자료.pptx
+++ b/doc/발표자료/20200908_1차_팀플레이어_발표자료.pptx
@@ -12,10 +12,13 @@
     <p:sldId id="274" r:id="rId6"/>
     <p:sldId id="266" r:id="rId7"/>
     <p:sldId id="273" r:id="rId8"/>
-    <p:sldId id="267" r:id="rId9"/>
-    <p:sldId id="268" r:id="rId10"/>
-    <p:sldId id="269" r:id="rId11"/>
-    <p:sldId id="270" r:id="rId12"/>
+    <p:sldId id="276" r:id="rId9"/>
+    <p:sldId id="277" r:id="rId10"/>
+    <p:sldId id="267" r:id="rId11"/>
+    <p:sldId id="268" r:id="rId12"/>
+    <p:sldId id="269" r:id="rId13"/>
+    <p:sldId id="270" r:id="rId14"/>
+    <p:sldId id="275" r:id="rId15"/>
   </p:sldIdLst>
   <p:sldSz cx="12192000" cy="6858000"/>
   <p:notesSz cx="6858000" cy="9144000"/>
@@ -253,7 +256,7 @@
           <a:p>
             <a:fld id="{E48BB6F7-1E08-463D-8531-7279FBDCC757}" type="datetimeFigureOut">
               <a:rPr lang="ko-KR" altLang="en-US" smtClean="0"/>
-              <a:t>2020-09-08</a:t>
+              <a:t>2020-09-09</a:t>
             </a:fld>
             <a:endParaRPr lang="ko-KR" altLang="en-US"/>
           </a:p>
@@ -423,7 +426,7 @@
           <a:p>
             <a:fld id="{E48BB6F7-1E08-463D-8531-7279FBDCC757}" type="datetimeFigureOut">
               <a:rPr lang="ko-KR" altLang="en-US" smtClean="0"/>
-              <a:t>2020-09-08</a:t>
+              <a:t>2020-09-09</a:t>
             </a:fld>
             <a:endParaRPr lang="ko-KR" altLang="en-US"/>
           </a:p>
@@ -603,7 +606,7 @@
           <a:p>
             <a:fld id="{E48BB6F7-1E08-463D-8531-7279FBDCC757}" type="datetimeFigureOut">
               <a:rPr lang="ko-KR" altLang="en-US" smtClean="0"/>
-              <a:t>2020-09-08</a:t>
+              <a:t>2020-09-09</a:t>
             </a:fld>
             <a:endParaRPr lang="ko-KR" altLang="en-US"/>
           </a:p>
@@ -773,7 +776,7 @@
           <a:p>
             <a:fld id="{E48BB6F7-1E08-463D-8531-7279FBDCC757}" type="datetimeFigureOut">
               <a:rPr lang="ko-KR" altLang="en-US" smtClean="0"/>
-              <a:t>2020-09-08</a:t>
+              <a:t>2020-09-09</a:t>
             </a:fld>
             <a:endParaRPr lang="ko-KR" altLang="en-US"/>
           </a:p>
@@ -1019,7 +1022,7 @@
           <a:p>
             <a:fld id="{E48BB6F7-1E08-463D-8531-7279FBDCC757}" type="datetimeFigureOut">
               <a:rPr lang="ko-KR" altLang="en-US" smtClean="0"/>
-              <a:t>2020-09-08</a:t>
+              <a:t>2020-09-09</a:t>
             </a:fld>
             <a:endParaRPr lang="ko-KR" altLang="en-US"/>
           </a:p>
@@ -1251,7 +1254,7 @@
           <a:p>
             <a:fld id="{E48BB6F7-1E08-463D-8531-7279FBDCC757}" type="datetimeFigureOut">
               <a:rPr lang="ko-KR" altLang="en-US" smtClean="0"/>
-              <a:t>2020-09-08</a:t>
+              <a:t>2020-09-09</a:t>
             </a:fld>
             <a:endParaRPr lang="ko-KR" altLang="en-US"/>
           </a:p>
@@ -1618,7 +1621,7 @@
           <a:p>
             <a:fld id="{E48BB6F7-1E08-463D-8531-7279FBDCC757}" type="datetimeFigureOut">
               <a:rPr lang="ko-KR" altLang="en-US" smtClean="0"/>
-              <a:t>2020-09-08</a:t>
+              <a:t>2020-09-09</a:t>
             </a:fld>
             <a:endParaRPr lang="ko-KR" altLang="en-US"/>
           </a:p>
@@ -1736,7 +1739,7 @@
           <a:p>
             <a:fld id="{E48BB6F7-1E08-463D-8531-7279FBDCC757}" type="datetimeFigureOut">
               <a:rPr lang="ko-KR" altLang="en-US" smtClean="0"/>
-              <a:t>2020-09-08</a:t>
+              <a:t>2020-09-09</a:t>
             </a:fld>
             <a:endParaRPr lang="ko-KR" altLang="en-US"/>
           </a:p>
@@ -1831,7 +1834,7 @@
           <a:p>
             <a:fld id="{E48BB6F7-1E08-463D-8531-7279FBDCC757}" type="datetimeFigureOut">
               <a:rPr lang="ko-KR" altLang="en-US" smtClean="0"/>
-              <a:t>2020-09-08</a:t>
+              <a:t>2020-09-09</a:t>
             </a:fld>
             <a:endParaRPr lang="ko-KR" altLang="en-US"/>
           </a:p>
@@ -2108,7 +2111,7 @@
           <a:p>
             <a:fld id="{E48BB6F7-1E08-463D-8531-7279FBDCC757}" type="datetimeFigureOut">
               <a:rPr lang="ko-KR" altLang="en-US" smtClean="0"/>
-              <a:t>2020-09-08</a:t>
+              <a:t>2020-09-09</a:t>
             </a:fld>
             <a:endParaRPr lang="ko-KR" altLang="en-US"/>
           </a:p>
@@ -2361,7 +2364,7 @@
           <a:p>
             <a:fld id="{E48BB6F7-1E08-463D-8531-7279FBDCC757}" type="datetimeFigureOut">
               <a:rPr lang="ko-KR" altLang="en-US" smtClean="0"/>
-              <a:t>2020-09-08</a:t>
+              <a:t>2020-09-09</a:t>
             </a:fld>
             <a:endParaRPr lang="ko-KR" altLang="en-US"/>
           </a:p>
@@ -2574,7 +2577,7 @@
           <a:p>
             <a:fld id="{E48BB6F7-1E08-463D-8531-7279FBDCC757}" type="datetimeFigureOut">
               <a:rPr lang="ko-KR" altLang="en-US" smtClean="0"/>
-              <a:t>2020-09-08</a:t>
+              <a:t>2020-09-09</a:t>
             </a:fld>
             <a:endParaRPr lang="ko-KR" altLang="en-US"/>
           </a:p>
@@ -3285,7 +3288,7 @@
       </p:pic>
       <p:pic>
         <p:nvPicPr>
-          <p:cNvPr id="8194" name="Picture 2" descr="텅 빈 극장…행사 연기…무관객 음악쇼 : 뉴스 : 동아닷컴"/>
+          <p:cNvPr id="5122" name="Picture 2" descr="아이엠스쿨 - 대한민국 1등 모바일 알림장"/>
           <p:cNvPicPr>
             <a:picLocks noChangeAspect="1" noChangeArrowheads="1"/>
           </p:cNvPicPr>
@@ -3306,8 +3309,8 @@
         </p:blipFill>
         <p:spPr bwMode="auto">
           <a:xfrm>
-            <a:off x="1196967" y="2227503"/>
-            <a:ext cx="3722896" cy="2481931"/>
+            <a:off x="4168524" y="1470514"/>
+            <a:ext cx="3854952" cy="4272572"/>
           </a:xfrm>
           <a:prstGeom prst="rect">
             <a:avLst/>
@@ -3332,8 +3335,8 @@
         </p:nvSpPr>
         <p:spPr>
           <a:xfrm>
-            <a:off x="5108796" y="4291799"/>
-            <a:ext cx="6414837" cy="369332"/>
+            <a:off x="1144587" y="3429000"/>
+            <a:ext cx="6047874" cy="646331"/>
           </a:xfrm>
           <a:prstGeom prst="rect">
             <a:avLst/>
@@ -3347,16 +3350,57 @@
           <a:lstStyle/>
           <a:p>
             <a:r>
-              <a:rPr lang="ko-KR" altLang="en-US" dirty="0"/>
-              <a:t>코로나로 인해 심각한 피해를 입은 영화관들의 피해 최소화</a:t>
+              <a:rPr lang="ko-KR" altLang="en-US" dirty="0" smtClean="0"/>
+              <a:t>영화관과 제휴하여 예매까지</a:t>
             </a:r>
             <a:endParaRPr lang="en-US" altLang="ko-KR" dirty="0" smtClean="0"/>
           </a:p>
-        </p:txBody>
-      </p:sp>
-      <p:sp>
-        <p:nvSpPr>
-          <p:cNvPr id="6" name="제목 1"/>
+          <a:p>
+            <a:r>
+              <a:rPr lang="ko-KR" altLang="en-US" dirty="0" smtClean="0"/>
+              <a:t>직접 해주는 서비스</a:t>
+            </a:r>
+            <a:endParaRPr lang="en-US" altLang="ko-KR" dirty="0" smtClean="0"/>
+          </a:p>
+        </p:txBody>
+      </p:sp>
+      <p:sp>
+        <p:nvSpPr>
+          <p:cNvPr id="6" name="TextBox 5"/>
+          <p:cNvSpPr txBox="1"/>
+          <p:nvPr/>
+        </p:nvSpPr>
+        <p:spPr>
+          <a:xfrm>
+            <a:off x="5408953" y="3194001"/>
+            <a:ext cx="1374094" cy="400110"/>
+          </a:xfrm>
+          <a:prstGeom prst="rect">
+            <a:avLst/>
+          </a:prstGeom>
+          <a:noFill/>
+        </p:spPr>
+        <p:txBody>
+          <a:bodyPr wrap="none" rtlCol="0">
+            <a:spAutoFit/>
+          </a:bodyPr>
+          <a:lstStyle/>
+          <a:p>
+            <a:r>
+              <a:rPr lang="ko-KR" altLang="en-US" sz="2000" b="1" dirty="0" smtClean="0"/>
+              <a:t>예매 완료</a:t>
+            </a:r>
+            <a:r>
+              <a:rPr lang="en-US" altLang="ko-KR" sz="2000" b="1" dirty="0" smtClean="0"/>
+              <a:t>!</a:t>
+            </a:r>
+            <a:endParaRPr lang="ko-KR" altLang="en-US" sz="2000" b="1" dirty="0"/>
+          </a:p>
+        </p:txBody>
+      </p:sp>
+      <p:sp>
+        <p:nvSpPr>
+          <p:cNvPr id="8" name="제목 1"/>
           <p:cNvSpPr txBox="1">
             <a:spLocks/>
           </p:cNvSpPr>
@@ -3401,7 +3445,7 @@
                 <a:latin typeface="배달의민족 을지로체 TTF" panose="020B0600000101010101" pitchFamily="50" charset="-127"/>
                 <a:ea typeface="배달의민족 을지로체 TTF" panose="020B0600000101010101" pitchFamily="50" charset="-127"/>
               </a:rPr>
-              <a:t>안전하게</a:t>
+              <a:t>간편하게</a:t>
             </a:r>
             <a:endParaRPr lang="ko-KR" altLang="en-US" dirty="0">
               <a:latin typeface="배달의민족 을지로체 TTF" panose="020B0600000101010101" pitchFamily="50" charset="-127"/>
@@ -3413,7 +3457,7 @@
     </p:spTree>
     <p:extLst>
       <p:ext uri="{BB962C8B-B14F-4D97-AF65-F5344CB8AC3E}">
-        <p14:creationId xmlns:p14="http://schemas.microsoft.com/office/powerpoint/2010/main" val="2765927333"/>
+        <p14:creationId xmlns:p14="http://schemas.microsoft.com/office/powerpoint/2010/main" val="1146245777"/>
       </p:ext>
     </p:extLst>
   </p:cSld>
@@ -3449,7 +3493,7 @@
       </p:grpSpPr>
       <p:pic>
         <p:nvPicPr>
-          <p:cNvPr id="7" name="그림 6"/>
+          <p:cNvPr id="8" name="그림 7"/>
           <p:cNvPicPr>
             <a:picLocks noChangeAspect="1"/>
           </p:cNvPicPr>
@@ -3486,7 +3530,7 @@
       </p:pic>
       <p:pic>
         <p:nvPicPr>
-          <p:cNvPr id="9218" name="Picture 2" descr="애인있어도 혼자 영화보는 게 좋은 이유 7가지 - 인사이트"/>
+          <p:cNvPr id="7170" name="Picture 2" descr="검색 사용자 분석"/>
           <p:cNvPicPr>
             <a:picLocks noChangeAspect="1" noChangeArrowheads="1"/>
           </p:cNvPicPr>
@@ -3507,8 +3551,8 @@
         </p:blipFill>
         <p:spPr bwMode="auto">
           <a:xfrm>
-            <a:off x="3376863" y="1956468"/>
-            <a:ext cx="4955006" cy="2831432"/>
+            <a:off x="2792662" y="2055829"/>
+            <a:ext cx="7031822" cy="2309972"/>
           </a:xfrm>
           <a:prstGeom prst="rect">
             <a:avLst/>
@@ -3533,8 +3577,8 @@
         </p:nvSpPr>
         <p:spPr>
           <a:xfrm>
-            <a:off x="3616492" y="4966433"/>
-            <a:ext cx="6047874" cy="369332"/>
+            <a:off x="2644098" y="4607105"/>
+            <a:ext cx="7621337" cy="369332"/>
           </a:xfrm>
           <a:prstGeom prst="rect">
             <a:avLst/>
@@ -3549,15 +3593,7 @@
           <a:p>
             <a:r>
               <a:rPr lang="ko-KR" altLang="en-US" dirty="0"/>
-              <a:t>혼자 영화를 </a:t>
-            </a:r>
-            <a:r>
-              <a:rPr lang="ko-KR" altLang="en-US" dirty="0" smtClean="0"/>
-              <a:t>즐기고 싶거나 </a:t>
-            </a:r>
-            <a:r>
-              <a:rPr lang="ko-KR" altLang="en-US" dirty="0"/>
-              <a:t>사람이 없는 곳</a:t>
+              <a:t>카드사 데이터를 이용해서 시간대별로 주로 관람하는 고객층 나이 분석</a:t>
             </a:r>
             <a:endParaRPr lang="en-US" altLang="ko-KR" dirty="0" smtClean="0"/>
           </a:p>
@@ -3565,7 +3601,7 @@
       </p:sp>
       <p:sp>
         <p:nvSpPr>
-          <p:cNvPr id="6" name="제목 1"/>
+          <p:cNvPr id="7" name="제목 1"/>
           <p:cNvSpPr txBox="1">
             <a:spLocks/>
           </p:cNvSpPr>
@@ -3610,7 +3646,7 @@
                 <a:latin typeface="배달의민족 을지로체 TTF" panose="020B0600000101010101" pitchFamily="50" charset="-127"/>
                 <a:ea typeface="배달의민족 을지로체 TTF" panose="020B0600000101010101" pitchFamily="50" charset="-127"/>
               </a:rPr>
-              <a:t>즐겁게</a:t>
+              <a:t>똑똑하게</a:t>
             </a:r>
             <a:endParaRPr lang="ko-KR" altLang="en-US" dirty="0">
               <a:latin typeface="배달의민족 을지로체 TTF" panose="020B0600000101010101" pitchFamily="50" charset="-127"/>
@@ -3622,7 +3658,554 @@
     </p:spTree>
     <p:extLst>
       <p:ext uri="{BB962C8B-B14F-4D97-AF65-F5344CB8AC3E}">
+        <p14:creationId xmlns:p14="http://schemas.microsoft.com/office/powerpoint/2010/main" val="747282366"/>
+      </p:ext>
+    </p:extLst>
+  </p:cSld>
+  <p:clrMapOvr>
+    <a:masterClrMapping/>
+  </p:clrMapOvr>
+  <p:timing>
+    <p:tnLst>
+      <p:par>
+        <p:cTn id="1" dur="indefinite" restart="never" nodeType="tmRoot"/>
+      </p:par>
+    </p:tnLst>
+  </p:timing>
+</p:sld>
+</file>
+
+<file path=ppt/slides/slide12.xml><?xml version="1.0" encoding="utf-8"?>
+<p:sld xmlns:a="http://schemas.openxmlformats.org/drawingml/2006/main" xmlns:r="http://schemas.openxmlformats.org/officeDocument/2006/relationships" xmlns:p="http://schemas.openxmlformats.org/presentationml/2006/main">
+  <p:cSld>
+    <p:spTree>
+      <p:nvGrpSpPr>
+        <p:cNvPr id="1" name=""/>
+        <p:cNvGrpSpPr/>
+        <p:nvPr/>
+      </p:nvGrpSpPr>
+      <p:grpSpPr>
+        <a:xfrm>
+          <a:off x="0" y="0"/>
+          <a:ext cx="0" cy="0"/>
+          <a:chOff x="0" y="0"/>
+          <a:chExt cx="0" cy="0"/>
+        </a:xfrm>
+      </p:grpSpPr>
+      <p:pic>
+        <p:nvPicPr>
+          <p:cNvPr id="7" name="그림 6"/>
+          <p:cNvPicPr>
+            <a:picLocks noChangeAspect="1"/>
+          </p:cNvPicPr>
+          <p:nvPr/>
+        </p:nvPicPr>
+        <p:blipFill>
+          <a:blip r:embed="rId2">
+            <a:duotone>
+              <a:schemeClr val="accent3">
+                <a:shade val="45000"/>
+                <a:satMod val="135000"/>
+              </a:schemeClr>
+              <a:prstClr val="white"/>
+            </a:duotone>
+            <a:extLst>
+              <a:ext uri="{28A0092B-C50C-407E-A947-70E740481C1C}">
+                <a14:useLocalDpi xmlns:a14="http://schemas.microsoft.com/office/drawing/2010/main" val="0"/>
+              </a:ext>
+            </a:extLst>
+          </a:blip>
+          <a:stretch>
+            <a:fillRect/>
+          </a:stretch>
+        </p:blipFill>
+        <p:spPr>
+          <a:xfrm>
+            <a:off x="0" y="0"/>
+            <a:ext cx="12192000" cy="6858000"/>
+          </a:xfrm>
+          <a:prstGeom prst="rect">
+            <a:avLst/>
+          </a:prstGeom>
+        </p:spPr>
+      </p:pic>
+      <p:pic>
+        <p:nvPicPr>
+          <p:cNvPr id="8194" name="Picture 2" descr="텅 빈 극장…행사 연기…무관객 음악쇼 : 뉴스 : 동아닷컴"/>
+          <p:cNvPicPr>
+            <a:picLocks noChangeAspect="1" noChangeArrowheads="1"/>
+          </p:cNvPicPr>
+          <p:nvPr/>
+        </p:nvPicPr>
+        <p:blipFill>
+          <a:blip r:embed="rId3">
+            <a:extLst>
+              <a:ext uri="{28A0092B-C50C-407E-A947-70E740481C1C}">
+                <a14:useLocalDpi xmlns:a14="http://schemas.microsoft.com/office/drawing/2010/main" val="0"/>
+              </a:ext>
+            </a:extLst>
+          </a:blip>
+          <a:srcRect/>
+          <a:stretch>
+            <a:fillRect/>
+          </a:stretch>
+        </p:blipFill>
+        <p:spPr bwMode="auto">
+          <a:xfrm>
+            <a:off x="1196967" y="2227503"/>
+            <a:ext cx="3722896" cy="2481931"/>
+          </a:xfrm>
+          <a:prstGeom prst="rect">
+            <a:avLst/>
+          </a:prstGeom>
+          <a:noFill/>
+          <a:extLst>
+            <a:ext uri="{909E8E84-426E-40DD-AFC4-6F175D3DCCD1}">
+              <a14:hiddenFill xmlns:a14="http://schemas.microsoft.com/office/drawing/2010/main">
+                <a:solidFill>
+                  <a:srgbClr val="FFFFFF"/>
+                </a:solidFill>
+              </a14:hiddenFill>
+            </a:ext>
+          </a:extLst>
+        </p:spPr>
+      </p:pic>
+      <p:sp>
+        <p:nvSpPr>
+          <p:cNvPr id="4" name="TextBox 3"/>
+          <p:cNvSpPr txBox="1"/>
+          <p:nvPr/>
+        </p:nvSpPr>
+        <p:spPr>
+          <a:xfrm>
+            <a:off x="5108796" y="4291799"/>
+            <a:ext cx="6414837" cy="369332"/>
+          </a:xfrm>
+          <a:prstGeom prst="rect">
+            <a:avLst/>
+          </a:prstGeom>
+          <a:noFill/>
+        </p:spPr>
+        <p:txBody>
+          <a:bodyPr wrap="square" rtlCol="0">
+            <a:spAutoFit/>
+          </a:bodyPr>
+          <a:lstStyle/>
+          <a:p>
+            <a:r>
+              <a:rPr lang="ko-KR" altLang="en-US" dirty="0"/>
+              <a:t>코로나로 인해 심각한 피해를 입은 영화관들의 피해 최소화</a:t>
+            </a:r>
+            <a:endParaRPr lang="en-US" altLang="ko-KR" dirty="0" smtClean="0"/>
+          </a:p>
+        </p:txBody>
+      </p:sp>
+      <p:sp>
+        <p:nvSpPr>
+          <p:cNvPr id="6" name="제목 1"/>
+          <p:cNvSpPr txBox="1">
+            <a:spLocks/>
+          </p:cNvSpPr>
+          <p:nvPr/>
+        </p:nvSpPr>
+        <p:spPr>
+          <a:xfrm>
+            <a:off x="1196967" y="901940"/>
+            <a:ext cx="10515600" cy="1325563"/>
+          </a:xfrm>
+          <a:prstGeom prst="rect">
+            <a:avLst/>
+          </a:prstGeom>
+        </p:spPr>
+        <p:txBody>
+          <a:bodyPr vert="horz" lIns="91440" tIns="45720" rIns="91440" bIns="45720" rtlCol="0" anchor="ctr">
+            <a:normAutofit/>
+          </a:bodyPr>
+          <a:lstStyle>
+            <a:lvl1pPr algn="l" defTabSz="914400" rtl="0" eaLnBrk="1" latinLnBrk="1" hangingPunct="1">
+              <a:lnSpc>
+                <a:spcPct val="90000"/>
+              </a:lnSpc>
+              <a:spcBef>
+                <a:spcPct val="0"/>
+              </a:spcBef>
+              <a:buNone/>
+              <a:defRPr sz="4400" kern="1200">
+                <a:solidFill>
+                  <a:schemeClr val="tx1"/>
+                </a:solidFill>
+                <a:latin typeface="+mj-lt"/>
+                <a:ea typeface="+mj-ea"/>
+                <a:cs typeface="+mj-cs"/>
+              </a:defRPr>
+            </a:lvl1pPr>
+          </a:lstStyle>
+          <a:p>
+            <a:pPr algn="r"/>
+            <a:r>
+              <a:rPr lang="ko-KR" altLang="en-US" dirty="0" smtClean="0">
+                <a:latin typeface="배달의민족 을지로체 TTF" panose="020B0600000101010101" pitchFamily="50" charset="-127"/>
+                <a:ea typeface="배달의민족 을지로체 TTF" panose="020B0600000101010101" pitchFamily="50" charset="-127"/>
+              </a:rPr>
+              <a:t>안전하게</a:t>
+            </a:r>
+            <a:endParaRPr lang="ko-KR" altLang="en-US" dirty="0">
+              <a:latin typeface="배달의민족 을지로체 TTF" panose="020B0600000101010101" pitchFamily="50" charset="-127"/>
+              <a:ea typeface="배달의민족 을지로체 TTF" panose="020B0600000101010101" pitchFamily="50" charset="-127"/>
+            </a:endParaRPr>
+          </a:p>
+        </p:txBody>
+      </p:sp>
+    </p:spTree>
+    <p:extLst>
+      <p:ext uri="{BB962C8B-B14F-4D97-AF65-F5344CB8AC3E}">
+        <p14:creationId xmlns:p14="http://schemas.microsoft.com/office/powerpoint/2010/main" val="2765927333"/>
+      </p:ext>
+    </p:extLst>
+  </p:cSld>
+  <p:clrMapOvr>
+    <a:masterClrMapping/>
+  </p:clrMapOvr>
+  <p:timing>
+    <p:tnLst>
+      <p:par>
+        <p:cTn id="1" dur="indefinite" restart="never" nodeType="tmRoot"/>
+      </p:par>
+    </p:tnLst>
+  </p:timing>
+</p:sld>
+</file>
+
+<file path=ppt/slides/slide13.xml><?xml version="1.0" encoding="utf-8"?>
+<p:sld xmlns:a="http://schemas.openxmlformats.org/drawingml/2006/main" xmlns:r="http://schemas.openxmlformats.org/officeDocument/2006/relationships" xmlns:p="http://schemas.openxmlformats.org/presentationml/2006/main">
+  <p:cSld>
+    <p:spTree>
+      <p:nvGrpSpPr>
+        <p:cNvPr id="1" name=""/>
+        <p:cNvGrpSpPr/>
+        <p:nvPr/>
+      </p:nvGrpSpPr>
+      <p:grpSpPr>
+        <a:xfrm>
+          <a:off x="0" y="0"/>
+          <a:ext cx="0" cy="0"/>
+          <a:chOff x="0" y="0"/>
+          <a:chExt cx="0" cy="0"/>
+        </a:xfrm>
+      </p:grpSpPr>
+      <p:pic>
+        <p:nvPicPr>
+          <p:cNvPr id="7" name="그림 6"/>
+          <p:cNvPicPr>
+            <a:picLocks noChangeAspect="1"/>
+          </p:cNvPicPr>
+          <p:nvPr/>
+        </p:nvPicPr>
+        <p:blipFill>
+          <a:blip r:embed="rId2">
+            <a:duotone>
+              <a:schemeClr val="accent3">
+                <a:shade val="45000"/>
+                <a:satMod val="135000"/>
+              </a:schemeClr>
+              <a:prstClr val="white"/>
+            </a:duotone>
+            <a:extLst>
+              <a:ext uri="{28A0092B-C50C-407E-A947-70E740481C1C}">
+                <a14:useLocalDpi xmlns:a14="http://schemas.microsoft.com/office/drawing/2010/main" val="0"/>
+              </a:ext>
+            </a:extLst>
+          </a:blip>
+          <a:stretch>
+            <a:fillRect/>
+          </a:stretch>
+        </p:blipFill>
+        <p:spPr>
+          <a:xfrm>
+            <a:off x="0" y="0"/>
+            <a:ext cx="12192000" cy="6858000"/>
+          </a:xfrm>
+          <a:prstGeom prst="rect">
+            <a:avLst/>
+          </a:prstGeom>
+        </p:spPr>
+      </p:pic>
+      <p:pic>
+        <p:nvPicPr>
+          <p:cNvPr id="9218" name="Picture 2" descr="애인있어도 혼자 영화보는 게 좋은 이유 7가지 - 인사이트"/>
+          <p:cNvPicPr>
+            <a:picLocks noChangeAspect="1" noChangeArrowheads="1"/>
+          </p:cNvPicPr>
+          <p:nvPr/>
+        </p:nvPicPr>
+        <p:blipFill>
+          <a:blip r:embed="rId3">
+            <a:extLst>
+              <a:ext uri="{28A0092B-C50C-407E-A947-70E740481C1C}">
+                <a14:useLocalDpi xmlns:a14="http://schemas.microsoft.com/office/drawing/2010/main" val="0"/>
+              </a:ext>
+            </a:extLst>
+          </a:blip>
+          <a:srcRect/>
+          <a:stretch>
+            <a:fillRect/>
+          </a:stretch>
+        </p:blipFill>
+        <p:spPr bwMode="auto">
+          <a:xfrm>
+            <a:off x="3376863" y="1956468"/>
+            <a:ext cx="4955006" cy="2831432"/>
+          </a:xfrm>
+          <a:prstGeom prst="rect">
+            <a:avLst/>
+          </a:prstGeom>
+          <a:noFill/>
+          <a:extLst>
+            <a:ext uri="{909E8E84-426E-40DD-AFC4-6F175D3DCCD1}">
+              <a14:hiddenFill xmlns:a14="http://schemas.microsoft.com/office/drawing/2010/main">
+                <a:solidFill>
+                  <a:srgbClr val="FFFFFF"/>
+                </a:solidFill>
+              </a14:hiddenFill>
+            </a:ext>
+          </a:extLst>
+        </p:spPr>
+      </p:pic>
+      <p:sp>
+        <p:nvSpPr>
+          <p:cNvPr id="4" name="TextBox 3"/>
+          <p:cNvSpPr txBox="1"/>
+          <p:nvPr/>
+        </p:nvSpPr>
+        <p:spPr>
+          <a:xfrm>
+            <a:off x="3616492" y="4966433"/>
+            <a:ext cx="6047874" cy="369332"/>
+          </a:xfrm>
+          <a:prstGeom prst="rect">
+            <a:avLst/>
+          </a:prstGeom>
+          <a:noFill/>
+        </p:spPr>
+        <p:txBody>
+          <a:bodyPr wrap="square" rtlCol="0">
+            <a:spAutoFit/>
+          </a:bodyPr>
+          <a:lstStyle/>
+          <a:p>
+            <a:r>
+              <a:rPr lang="ko-KR" altLang="en-US" dirty="0"/>
+              <a:t>혼자 영화를 </a:t>
+            </a:r>
+            <a:r>
+              <a:rPr lang="ko-KR" altLang="en-US" dirty="0" smtClean="0"/>
+              <a:t>즐기고 싶거나 </a:t>
+            </a:r>
+            <a:r>
+              <a:rPr lang="ko-KR" altLang="en-US" dirty="0"/>
+              <a:t>사람이 없는 곳</a:t>
+            </a:r>
+            <a:endParaRPr lang="en-US" altLang="ko-KR" dirty="0" smtClean="0"/>
+          </a:p>
+        </p:txBody>
+      </p:sp>
+      <p:sp>
+        <p:nvSpPr>
+          <p:cNvPr id="6" name="제목 1"/>
+          <p:cNvSpPr txBox="1">
+            <a:spLocks/>
+          </p:cNvSpPr>
+          <p:nvPr/>
+        </p:nvSpPr>
+        <p:spPr>
+          <a:xfrm>
+            <a:off x="1196967" y="901940"/>
+            <a:ext cx="10515600" cy="1325563"/>
+          </a:xfrm>
+          <a:prstGeom prst="rect">
+            <a:avLst/>
+          </a:prstGeom>
+        </p:spPr>
+        <p:txBody>
+          <a:bodyPr vert="horz" lIns="91440" tIns="45720" rIns="91440" bIns="45720" rtlCol="0" anchor="ctr">
+            <a:normAutofit/>
+          </a:bodyPr>
+          <a:lstStyle>
+            <a:lvl1pPr algn="l" defTabSz="914400" rtl="0" eaLnBrk="1" latinLnBrk="1" hangingPunct="1">
+              <a:lnSpc>
+                <a:spcPct val="90000"/>
+              </a:lnSpc>
+              <a:spcBef>
+                <a:spcPct val="0"/>
+              </a:spcBef>
+              <a:buNone/>
+              <a:defRPr sz="4400" kern="1200">
+                <a:solidFill>
+                  <a:schemeClr val="tx1"/>
+                </a:solidFill>
+                <a:latin typeface="+mj-lt"/>
+                <a:ea typeface="+mj-ea"/>
+                <a:cs typeface="+mj-cs"/>
+              </a:defRPr>
+            </a:lvl1pPr>
+          </a:lstStyle>
+          <a:p>
+            <a:pPr algn="r"/>
+            <a:r>
+              <a:rPr lang="ko-KR" altLang="en-US" dirty="0" smtClean="0">
+                <a:latin typeface="배달의민족 을지로체 TTF" panose="020B0600000101010101" pitchFamily="50" charset="-127"/>
+                <a:ea typeface="배달의민족 을지로체 TTF" panose="020B0600000101010101" pitchFamily="50" charset="-127"/>
+              </a:rPr>
+              <a:t>즐겁게</a:t>
+            </a:r>
+            <a:endParaRPr lang="ko-KR" altLang="en-US" dirty="0">
+              <a:latin typeface="배달의민족 을지로체 TTF" panose="020B0600000101010101" pitchFamily="50" charset="-127"/>
+              <a:ea typeface="배달의민족 을지로체 TTF" panose="020B0600000101010101" pitchFamily="50" charset="-127"/>
+            </a:endParaRPr>
+          </a:p>
+        </p:txBody>
+      </p:sp>
+    </p:spTree>
+    <p:extLst>
+      <p:ext uri="{BB962C8B-B14F-4D97-AF65-F5344CB8AC3E}">
         <p14:creationId xmlns:p14="http://schemas.microsoft.com/office/powerpoint/2010/main" val="3867254694"/>
+      </p:ext>
+    </p:extLst>
+  </p:cSld>
+  <p:clrMapOvr>
+    <a:masterClrMapping/>
+  </p:clrMapOvr>
+  <p:timing>
+    <p:tnLst>
+      <p:par>
+        <p:cTn id="1" dur="indefinite" restart="never" nodeType="tmRoot"/>
+      </p:par>
+    </p:tnLst>
+  </p:timing>
+</p:sld>
+</file>
+
+<file path=ppt/slides/slide14.xml><?xml version="1.0" encoding="utf-8"?>
+<p:sld xmlns:a="http://schemas.openxmlformats.org/drawingml/2006/main" xmlns:r="http://schemas.openxmlformats.org/officeDocument/2006/relationships" xmlns:p="http://schemas.openxmlformats.org/presentationml/2006/main">
+  <p:cSld>
+    <p:spTree>
+      <p:nvGrpSpPr>
+        <p:cNvPr id="1" name=""/>
+        <p:cNvGrpSpPr/>
+        <p:nvPr/>
+      </p:nvGrpSpPr>
+      <p:grpSpPr>
+        <a:xfrm>
+          <a:off x="0" y="0"/>
+          <a:ext cx="0" cy="0"/>
+          <a:chOff x="0" y="0"/>
+          <a:chExt cx="0" cy="0"/>
+        </a:xfrm>
+      </p:grpSpPr>
+      <p:pic>
+        <p:nvPicPr>
+          <p:cNvPr id="7" name="그림 6"/>
+          <p:cNvPicPr>
+            <a:picLocks noChangeAspect="1"/>
+          </p:cNvPicPr>
+          <p:nvPr/>
+        </p:nvPicPr>
+        <p:blipFill>
+          <a:blip r:embed="rId2">
+            <a:duotone>
+              <a:schemeClr val="accent3">
+                <a:shade val="45000"/>
+                <a:satMod val="135000"/>
+              </a:schemeClr>
+              <a:prstClr val="white"/>
+            </a:duotone>
+            <a:extLst>
+              <a:ext uri="{28A0092B-C50C-407E-A947-70E740481C1C}">
+                <a14:useLocalDpi xmlns:a14="http://schemas.microsoft.com/office/drawing/2010/main" val="0"/>
+              </a:ext>
+            </a:extLst>
+          </a:blip>
+          <a:stretch>
+            <a:fillRect/>
+          </a:stretch>
+        </p:blipFill>
+        <p:spPr>
+          <a:xfrm>
+            <a:off x="0" y="0"/>
+            <a:ext cx="12192000" cy="6858000"/>
+          </a:xfrm>
+          <a:prstGeom prst="rect">
+            <a:avLst/>
+          </a:prstGeom>
+        </p:spPr>
+      </p:pic>
+      <p:sp>
+        <p:nvSpPr>
+          <p:cNvPr id="6" name="제목 1"/>
+          <p:cNvSpPr txBox="1">
+            <a:spLocks/>
+          </p:cNvSpPr>
+          <p:nvPr/>
+        </p:nvSpPr>
+        <p:spPr>
+          <a:xfrm>
+            <a:off x="838200" y="2766218"/>
+            <a:ext cx="10515600" cy="1325563"/>
+          </a:xfrm>
+          <a:prstGeom prst="rect">
+            <a:avLst/>
+          </a:prstGeom>
+        </p:spPr>
+        <p:txBody>
+          <a:bodyPr vert="horz" lIns="91440" tIns="45720" rIns="91440" bIns="45720" rtlCol="0" anchor="ctr">
+            <a:normAutofit/>
+          </a:bodyPr>
+          <a:lstStyle>
+            <a:lvl1pPr algn="l" defTabSz="914400" rtl="0" eaLnBrk="1" latinLnBrk="1" hangingPunct="1">
+              <a:lnSpc>
+                <a:spcPct val="90000"/>
+              </a:lnSpc>
+              <a:spcBef>
+                <a:spcPct val="0"/>
+              </a:spcBef>
+              <a:buNone/>
+              <a:defRPr sz="4400" kern="1200">
+                <a:solidFill>
+                  <a:schemeClr val="tx1"/>
+                </a:solidFill>
+                <a:latin typeface="+mj-lt"/>
+                <a:ea typeface="+mj-ea"/>
+                <a:cs typeface="+mj-cs"/>
+              </a:defRPr>
+            </a:lvl1pPr>
+          </a:lstStyle>
+          <a:p>
+            <a:pPr algn="ctr"/>
+            <a:r>
+              <a:rPr lang="ko-KR" altLang="en-US" dirty="0" smtClean="0">
+                <a:latin typeface="배달의민족 을지로체 TTF" panose="020B0600000101010101" pitchFamily="50" charset="-127"/>
+                <a:ea typeface="배달의민족 을지로체 TTF" panose="020B0600000101010101" pitchFamily="50" charset="-127"/>
+              </a:rPr>
+              <a:t>감사합니다</a:t>
+            </a:r>
+            <a:r>
+              <a:rPr lang="en-US" altLang="ko-KR" dirty="0" smtClean="0">
+                <a:latin typeface="배달의민족 을지로체 TTF" panose="020B0600000101010101" pitchFamily="50" charset="-127"/>
+                <a:ea typeface="배달의민족 을지로체 TTF" panose="020B0600000101010101" pitchFamily="50" charset="-127"/>
+              </a:rPr>
+              <a:t>.</a:t>
+            </a:r>
+            <a:endParaRPr lang="ko-KR" altLang="en-US" dirty="0">
+              <a:latin typeface="배달의민족 을지로체 TTF" panose="020B0600000101010101" pitchFamily="50" charset="-127"/>
+              <a:ea typeface="배달의민족 을지로체 TTF" panose="020B0600000101010101" pitchFamily="50" charset="-127"/>
+            </a:endParaRPr>
+          </a:p>
+        </p:txBody>
+      </p:sp>
+    </p:spTree>
+    <p:extLst>
+      <p:ext uri="{BB962C8B-B14F-4D97-AF65-F5344CB8AC3E}">
+        <p14:creationId xmlns:p14="http://schemas.microsoft.com/office/powerpoint/2010/main" val="1040955211"/>
       </p:ext>
     </p:extLst>
   </p:cSld>
@@ -4643,19 +5226,7 @@
             </a:r>
             <a:r>
               <a:rPr lang="ko-KR" altLang="en-US" dirty="0" smtClean="0"/>
-              <a:t>한곳에서 실시간 예매 </a:t>
-            </a:r>
-            <a:r>
-              <a:rPr lang="ko-KR" altLang="en-US" dirty="0" smtClean="0"/>
-              <a:t>현황</a:t>
-            </a:r>
-            <a:r>
-              <a:rPr lang="ko-KR" altLang="en-US" dirty="0" smtClean="0"/>
-              <a:t> </a:t>
-            </a:r>
-            <a:r>
-              <a:rPr lang="ko-KR" altLang="en-US" dirty="0" smtClean="0"/>
-              <a:t>확인</a:t>
+              <a:t>한곳에서 실시간 예매 현황 확인</a:t>
             </a:r>
             <a:endParaRPr lang="ko-KR" altLang="en-US" dirty="0"/>
           </a:p>
@@ -4886,11 +5457,7 @@
             </a:r>
             <a:r>
               <a:rPr lang="ko-KR" altLang="en-US" dirty="0" smtClean="0"/>
-              <a:t>한적한 극장 또는 </a:t>
-            </a:r>
-            <a:r>
-              <a:rPr lang="ko-KR" altLang="en-US" dirty="0" smtClean="0"/>
-              <a:t>혼잡한 극장 바로 확인</a:t>
+              <a:t>한적한 극장 또는 혼잡한 극장 바로 확인</a:t>
             </a:r>
             <a:endParaRPr lang="ko-KR" altLang="en-US" dirty="0"/>
           </a:p>
@@ -8742,7 +9309,7 @@
       </p:grpSpPr>
       <p:pic>
         <p:nvPicPr>
-          <p:cNvPr id="7" name="그림 6"/>
+          <p:cNvPr id="8" name="그림 7"/>
           <p:cNvPicPr>
             <a:picLocks noChangeAspect="1"/>
           </p:cNvPicPr>
@@ -8779,119 +9346,67 @@
       </p:pic>
       <p:pic>
         <p:nvPicPr>
-          <p:cNvPr id="5122" name="Picture 2" descr="아이엠스쿨 - 대한민국 1등 모바일 알림장"/>
+          <p:cNvPr id="4" name="그림 3"/>
           <p:cNvPicPr>
-            <a:picLocks noChangeAspect="1" noChangeArrowheads="1"/>
+            <a:picLocks noChangeAspect="1"/>
           </p:cNvPicPr>
           <p:nvPr/>
         </p:nvPicPr>
         <p:blipFill>
-          <a:blip r:embed="rId3">
+          <a:blip r:embed="rId3" cstate="print">
             <a:extLst>
               <a:ext uri="{28A0092B-C50C-407E-A947-70E740481C1C}">
                 <a14:useLocalDpi xmlns:a14="http://schemas.microsoft.com/office/drawing/2010/main" val="0"/>
               </a:ext>
             </a:extLst>
           </a:blip>
-          <a:srcRect/>
           <a:stretch>
             <a:fillRect/>
           </a:stretch>
         </p:blipFill>
-        <p:spPr bwMode="auto">
-          <a:xfrm>
-            <a:off x="4168524" y="1470514"/>
-            <a:ext cx="3854952" cy="4272572"/>
+        <p:spPr>
+          <a:xfrm>
+            <a:off x="1457802" y="1201070"/>
+            <a:ext cx="2216585" cy="4125310"/>
           </a:xfrm>
           <a:prstGeom prst="rect">
             <a:avLst/>
           </a:prstGeom>
-          <a:noFill/>
-          <a:extLst>
-            <a:ext uri="{909E8E84-426E-40DD-AFC4-6F175D3DCCD1}">
-              <a14:hiddenFill xmlns:a14="http://schemas.microsoft.com/office/drawing/2010/main">
-                <a:solidFill>
-                  <a:srgbClr val="FFFFFF"/>
-                </a:solidFill>
-              </a14:hiddenFill>
-            </a:ext>
-          </a:extLst>
         </p:spPr>
       </p:pic>
-      <p:sp>
-        <p:nvSpPr>
-          <p:cNvPr id="4" name="TextBox 3"/>
-          <p:cNvSpPr txBox="1"/>
-          <p:nvPr/>
-        </p:nvSpPr>
-        <p:spPr>
-          <a:xfrm>
-            <a:off x="1144587" y="3429000"/>
-            <a:ext cx="6047874" cy="646331"/>
+      <p:pic>
+        <p:nvPicPr>
+          <p:cNvPr id="7" name="그림 6"/>
+          <p:cNvPicPr>
+            <a:picLocks noChangeAspect="1"/>
+          </p:cNvPicPr>
+          <p:nvPr/>
+        </p:nvPicPr>
+        <p:blipFill>
+          <a:blip r:embed="rId4" cstate="print">
+            <a:extLst>
+              <a:ext uri="{28A0092B-C50C-407E-A947-70E740481C1C}">
+                <a14:useLocalDpi xmlns:a14="http://schemas.microsoft.com/office/drawing/2010/main" val="0"/>
+              </a:ext>
+            </a:extLst>
+          </a:blip>
+          <a:stretch>
+            <a:fillRect/>
+          </a:stretch>
+        </p:blipFill>
+        <p:spPr>
+          <a:xfrm>
+            <a:off x="4071395" y="1201070"/>
+            <a:ext cx="2121588" cy="4125310"/>
           </a:xfrm>
           <a:prstGeom prst="rect">
             <a:avLst/>
           </a:prstGeom>
-          <a:noFill/>
-        </p:spPr>
-        <p:txBody>
-          <a:bodyPr wrap="square" rtlCol="0">
-            <a:spAutoFit/>
-          </a:bodyPr>
-          <a:lstStyle/>
-          <a:p>
-            <a:r>
-              <a:rPr lang="ko-KR" altLang="en-US" dirty="0" smtClean="0"/>
-              <a:t>영화관과 제휴하여 예매까지</a:t>
-            </a:r>
-            <a:endParaRPr lang="en-US" altLang="ko-KR" dirty="0" smtClean="0"/>
-          </a:p>
-          <a:p>
-            <a:r>
-              <a:rPr lang="ko-KR" altLang="en-US" dirty="0" smtClean="0"/>
-              <a:t>직접 해주는 서비스</a:t>
-            </a:r>
-            <a:endParaRPr lang="en-US" altLang="ko-KR" dirty="0" smtClean="0"/>
-          </a:p>
-        </p:txBody>
-      </p:sp>
-      <p:sp>
-        <p:nvSpPr>
-          <p:cNvPr id="6" name="TextBox 5"/>
-          <p:cNvSpPr txBox="1"/>
-          <p:nvPr/>
-        </p:nvSpPr>
-        <p:spPr>
-          <a:xfrm>
-            <a:off x="5408953" y="3194001"/>
-            <a:ext cx="1374094" cy="400110"/>
-          </a:xfrm>
-          <a:prstGeom prst="rect">
-            <a:avLst/>
-          </a:prstGeom>
-          <a:noFill/>
-        </p:spPr>
-        <p:txBody>
-          <a:bodyPr wrap="none" rtlCol="0">
-            <a:spAutoFit/>
-          </a:bodyPr>
-          <a:lstStyle/>
-          <a:p>
-            <a:r>
-              <a:rPr lang="ko-KR" altLang="en-US" sz="2000" b="1" dirty="0" smtClean="0"/>
-              <a:t>예매 완료</a:t>
-            </a:r>
-            <a:r>
-              <a:rPr lang="en-US" altLang="ko-KR" sz="2000" b="1" dirty="0" smtClean="0"/>
-              <a:t>!</a:t>
-            </a:r>
-            <a:endParaRPr lang="ko-KR" altLang="en-US" sz="2000" b="1" dirty="0"/>
-          </a:p>
-        </p:txBody>
-      </p:sp>
-      <p:sp>
-        <p:nvSpPr>
-          <p:cNvPr id="8" name="제목 1"/>
+        </p:spPr>
+      </p:pic>
+      <p:sp>
+        <p:nvSpPr>
+          <p:cNvPr id="9" name="제목 1"/>
           <p:cNvSpPr txBox="1">
             <a:spLocks/>
           </p:cNvSpPr>
@@ -8936,7 +9451,7 @@
                 <a:latin typeface="배달의민족 을지로체 TTF" panose="020B0600000101010101" pitchFamily="50" charset="-127"/>
                 <a:ea typeface="배달의민족 을지로체 TTF" panose="020B0600000101010101" pitchFamily="50" charset="-127"/>
               </a:rPr>
-              <a:t>간편하게</a:t>
+              <a:t>맛만 보세요</a:t>
             </a:r>
             <a:endParaRPr lang="ko-KR" altLang="en-US" dirty="0">
               <a:latin typeface="배달의민족 을지로체 TTF" panose="020B0600000101010101" pitchFamily="50" charset="-127"/>
@@ -8945,23 +9460,46 @@
           </a:p>
         </p:txBody>
       </p:sp>
+      <p:sp>
+        <p:nvSpPr>
+          <p:cNvPr id="10" name="TextBox 9"/>
+          <p:cNvSpPr txBox="1"/>
+          <p:nvPr/>
+        </p:nvSpPr>
+        <p:spPr>
+          <a:xfrm>
+            <a:off x="6589991" y="4957048"/>
+            <a:ext cx="6047874" cy="369332"/>
+          </a:xfrm>
+          <a:prstGeom prst="rect">
+            <a:avLst/>
+          </a:prstGeom>
+          <a:noFill/>
+        </p:spPr>
+        <p:txBody>
+          <a:bodyPr wrap="square" rtlCol="0">
+            <a:spAutoFit/>
+          </a:bodyPr>
+          <a:lstStyle/>
+          <a:p>
+            <a:r>
+              <a:rPr lang="ko-KR" altLang="en-US" dirty="0" smtClean="0"/>
+              <a:t>통합된 영화 페이지</a:t>
+            </a:r>
+            <a:endParaRPr lang="en-US" altLang="ko-KR" dirty="0" smtClean="0"/>
+          </a:p>
+        </p:txBody>
+      </p:sp>
     </p:spTree>
     <p:extLst>
       <p:ext uri="{BB962C8B-B14F-4D97-AF65-F5344CB8AC3E}">
-        <p14:creationId xmlns:p14="http://schemas.microsoft.com/office/powerpoint/2010/main" val="1146245777"/>
+        <p14:creationId xmlns:p14="http://schemas.microsoft.com/office/powerpoint/2010/main" val="417878920"/>
       </p:ext>
     </p:extLst>
   </p:cSld>
   <p:clrMapOvr>
     <a:masterClrMapping/>
   </p:clrMapOvr>
-  <p:timing>
-    <p:tnLst>
-      <p:par>
-        <p:cTn id="1" dur="indefinite" restart="never" nodeType="tmRoot"/>
-      </p:par>
-    </p:tnLst>
-  </p:timing>
 </p:sld>
 </file>
 
@@ -8984,7 +9522,7 @@
       </p:grpSpPr>
       <p:pic>
         <p:nvPicPr>
-          <p:cNvPr id="8" name="그림 7"/>
+          <p:cNvPr id="6" name="그림 5"/>
           <p:cNvPicPr>
             <a:picLocks noChangeAspect="1"/>
           </p:cNvPicPr>
@@ -9021,78 +9559,67 @@
       </p:pic>
       <p:pic>
         <p:nvPicPr>
-          <p:cNvPr id="7170" name="Picture 2" descr="검색 사용자 분석"/>
+          <p:cNvPr id="5" name="그림 4"/>
           <p:cNvPicPr>
-            <a:picLocks noChangeAspect="1" noChangeArrowheads="1"/>
+            <a:picLocks noChangeAspect="1"/>
           </p:cNvPicPr>
           <p:nvPr/>
         </p:nvPicPr>
         <p:blipFill>
-          <a:blip r:embed="rId3">
+          <a:blip r:embed="rId3" cstate="print">
             <a:extLst>
               <a:ext uri="{28A0092B-C50C-407E-A947-70E740481C1C}">
                 <a14:useLocalDpi xmlns:a14="http://schemas.microsoft.com/office/drawing/2010/main" val="0"/>
               </a:ext>
             </a:extLst>
           </a:blip>
-          <a:srcRect/>
           <a:stretch>
             <a:fillRect/>
           </a:stretch>
         </p:blipFill>
-        <p:spPr bwMode="auto">
-          <a:xfrm>
-            <a:off x="2792662" y="2055829"/>
-            <a:ext cx="7031822" cy="2309972"/>
+        <p:spPr>
+          <a:xfrm>
+            <a:off x="1491811" y="1106476"/>
+            <a:ext cx="2087662" cy="4645048"/>
           </a:xfrm>
           <a:prstGeom prst="rect">
             <a:avLst/>
           </a:prstGeom>
-          <a:noFill/>
-          <a:extLst>
-            <a:ext uri="{909E8E84-426E-40DD-AFC4-6F175D3DCCD1}">
-              <a14:hiddenFill xmlns:a14="http://schemas.microsoft.com/office/drawing/2010/main">
-                <a:solidFill>
-                  <a:srgbClr val="FFFFFF"/>
-                </a:solidFill>
-              </a14:hiddenFill>
-            </a:ext>
-          </a:extLst>
         </p:spPr>
       </p:pic>
-      <p:sp>
-        <p:nvSpPr>
-          <p:cNvPr id="4" name="TextBox 3"/>
-          <p:cNvSpPr txBox="1"/>
-          <p:nvPr/>
-        </p:nvSpPr>
-        <p:spPr>
-          <a:xfrm>
-            <a:off x="2644098" y="4607105"/>
-            <a:ext cx="7621337" cy="369332"/>
+      <p:pic>
+        <p:nvPicPr>
+          <p:cNvPr id="2" name="그림 1"/>
+          <p:cNvPicPr>
+            <a:picLocks noChangeAspect="1"/>
+          </p:cNvPicPr>
+          <p:nvPr/>
+        </p:nvPicPr>
+        <p:blipFill>
+          <a:blip r:embed="rId4" cstate="print">
+            <a:extLst>
+              <a:ext uri="{28A0092B-C50C-407E-A947-70E740481C1C}">
+                <a14:useLocalDpi xmlns:a14="http://schemas.microsoft.com/office/drawing/2010/main" val="0"/>
+              </a:ext>
+            </a:extLst>
+          </a:blip>
+          <a:stretch>
+            <a:fillRect/>
+          </a:stretch>
+        </p:blipFill>
+        <p:spPr>
+          <a:xfrm>
+            <a:off x="3932635" y="1106476"/>
+            <a:ext cx="2342041" cy="4645048"/>
           </a:xfrm>
           <a:prstGeom prst="rect">
             <a:avLst/>
           </a:prstGeom>
-          <a:noFill/>
-        </p:spPr>
-        <p:txBody>
-          <a:bodyPr wrap="square" rtlCol="0">
-            <a:spAutoFit/>
-          </a:bodyPr>
-          <a:lstStyle/>
-          <a:p>
-            <a:r>
-              <a:rPr lang="ko-KR" altLang="en-US" dirty="0"/>
-              <a:t>카드사 데이터를 이용해서 시간대별로 주로 관람하는 고객층 나이 분석</a:t>
-            </a:r>
-            <a:endParaRPr lang="en-US" altLang="ko-KR" dirty="0" smtClean="0"/>
-          </a:p>
-        </p:txBody>
-      </p:sp>
-      <p:sp>
-        <p:nvSpPr>
-          <p:cNvPr id="7" name="제목 1"/>
+        </p:spPr>
+      </p:pic>
+      <p:sp>
+        <p:nvSpPr>
+          <p:cNvPr id="8" name="제목 1"/>
           <p:cNvSpPr txBox="1">
             <a:spLocks/>
           </p:cNvSpPr>
@@ -9133,11 +9660,11 @@
           <a:p>
             <a:pPr algn="r"/>
             <a:r>
-              <a:rPr lang="ko-KR" altLang="en-US" dirty="0" smtClean="0">
+              <a:rPr lang="ko-KR" altLang="en-US" dirty="0">
                 <a:latin typeface="배달의민족 을지로체 TTF" panose="020B0600000101010101" pitchFamily="50" charset="-127"/>
                 <a:ea typeface="배달의민족 을지로체 TTF" panose="020B0600000101010101" pitchFamily="50" charset="-127"/>
               </a:rPr>
-              <a:t>똑똑하게</a:t>
+              <a:t>맛만 보세요</a:t>
             </a:r>
             <a:endParaRPr lang="ko-KR" altLang="en-US" dirty="0">
               <a:latin typeface="배달의민족 을지로체 TTF" panose="020B0600000101010101" pitchFamily="50" charset="-127"/>
@@ -9146,23 +9673,54 @@
           </a:p>
         </p:txBody>
       </p:sp>
+      <p:sp>
+        <p:nvSpPr>
+          <p:cNvPr id="9" name="TextBox 8"/>
+          <p:cNvSpPr txBox="1"/>
+          <p:nvPr/>
+        </p:nvSpPr>
+        <p:spPr>
+          <a:xfrm>
+            <a:off x="6497288" y="4959409"/>
+            <a:ext cx="6047874" cy="369332"/>
+          </a:xfrm>
+          <a:prstGeom prst="rect">
+            <a:avLst/>
+          </a:prstGeom>
+          <a:noFill/>
+        </p:spPr>
+        <p:txBody>
+          <a:bodyPr wrap="square" rtlCol="0">
+            <a:spAutoFit/>
+          </a:bodyPr>
+          <a:lstStyle/>
+          <a:p>
+            <a:r>
+              <a:rPr lang="ko-KR" altLang="en-US" dirty="0" smtClean="0"/>
+              <a:t>영화 상영 전</a:t>
+            </a:r>
+            <a:r>
+              <a:rPr lang="en-US" altLang="ko-KR" dirty="0" smtClean="0"/>
+              <a:t>/</a:t>
+            </a:r>
+            <a:r>
+              <a:rPr lang="ko-KR" altLang="en-US" dirty="0" smtClean="0"/>
+              <a:t>후 즐길 거리 추천</a:t>
+            </a:r>
+            <a:endParaRPr lang="en-US" altLang="ko-KR" dirty="0" smtClean="0"/>
+          </a:p>
+        </p:txBody>
+      </p:sp>
     </p:spTree>
     <p:extLst>
       <p:ext uri="{BB962C8B-B14F-4D97-AF65-F5344CB8AC3E}">
-        <p14:creationId xmlns:p14="http://schemas.microsoft.com/office/powerpoint/2010/main" val="747282366"/>
+        <p14:creationId xmlns:p14="http://schemas.microsoft.com/office/powerpoint/2010/main" val="4078651256"/>
       </p:ext>
     </p:extLst>
   </p:cSld>
   <p:clrMapOvr>
     <a:masterClrMapping/>
   </p:clrMapOvr>
-  <p:timing>
-    <p:tnLst>
-      <p:par>
-        <p:cTn id="1" dur="indefinite" restart="never" nodeType="tmRoot"/>
-      </p:par>
-    </p:tnLst>
-  </p:timing>
 </p:sld>
 </file>
 

</xml_diff>